<commit_message>
fixed the "and IDE" typo. added brighter pic.
</commit_message>
<xml_diff>
--- a/slides/00_Introduction.pptx
+++ b/slides/00_Introduction.pptx
@@ -120,6 +120,11 @@
       </a:defRPr>
     </a:lvl9pPr>
   </p:defaultTextStyle>
+  <p:extLst>
+    <p:ext uri="{EFAFB233-063F-42B5-8137-9DF3F51BA10A}">
+      <p15:sldGuideLst xmlns:p15="http://schemas.microsoft.com/office/powerpoint/2012/main"/>
+    </p:ext>
+  </p:extLst>
 </p:presentation>
 </file>
 
@@ -4577,6 +4582,42 @@
           </a:prstGeom>
         </p:spPr>
       </p:pic>
+      <p:pic>
+        <p:nvPicPr>
+          <p:cNvPr id="6" name="Picture 5" descr="A person posing for the camera&#10;&#10;Description automatically generated">
+            <a:extLst>
+              <a:ext uri="{FF2B5EF4-FFF2-40B4-BE49-F238E27FC236}">
+                <a16:creationId xmlns:a16="http://schemas.microsoft.com/office/drawing/2014/main" id="{862C64D8-F5CC-4010-8310-E93BA1E56250}"/>
+              </a:ext>
+            </a:extLst>
+          </p:cNvPr>
+          <p:cNvPicPr>
+            <a:picLocks noChangeAspect="1"/>
+          </p:cNvPicPr>
+          <p:nvPr/>
+        </p:nvPicPr>
+        <p:blipFill>
+          <a:blip r:embed="rId4">
+            <a:extLst>
+              <a:ext uri="{28A0092B-C50C-407E-A947-70E740481C1C}">
+                <a14:useLocalDpi xmlns:a14="http://schemas.microsoft.com/office/drawing/2010/main" val="0"/>
+              </a:ext>
+            </a:extLst>
+          </a:blip>
+          <a:stretch>
+            <a:fillRect/>
+          </a:stretch>
+        </p:blipFill>
+        <p:spPr>
+          <a:xfrm>
+            <a:off x="642315" y="2873706"/>
+            <a:ext cx="1636118" cy="1750150"/>
+          </a:xfrm>
+          <a:prstGeom prst="rect">
+            <a:avLst/>
+          </a:prstGeom>
+        </p:spPr>
+      </p:pic>
     </p:spTree>
     <p:extLst>
       <p:ext uri="{BB962C8B-B14F-4D97-AF65-F5344CB8AC3E}">
@@ -4692,7 +4733,7 @@
                   </a:schemeClr>
                 </a:solidFill>
               </a:rPr>
-              <a:t>Use and IDE (integrated development environment), like RStudio</a:t>
+              <a:t>Use an IDE (integrated development environment), like RStudio</a:t>
             </a:r>
           </a:p>
           <a:p>
@@ -4776,8 +4817,8 @@
         </p:nvSpPr>
         <p:spPr>
           <a:xfrm>
-            <a:off x="2831969" y="4430772"/>
-            <a:ext cx="8521831" cy="2062103"/>
+            <a:off x="2353057" y="4430772"/>
+            <a:ext cx="9000744" cy="1692771"/>
           </a:xfrm>
           <a:prstGeom prst="rect">
             <a:avLst/>
@@ -4792,7 +4833,7 @@
           <a:p>
             <a:r>
               <a:rPr lang="en-US" sz="2800" dirty="0"/>
-              <a:t>TL;DR - machine and human readable and plays well with default ordering (put something numeric first). </a:t>
+              <a:t>TL;DR - machine and human readable and plays well with default ordering (put something numeric first in file names). </a:t>
             </a:r>
           </a:p>
           <a:p>
@@ -4998,7 +5039,7 @@
                   </a:schemeClr>
                 </a:solidFill>
               </a:rPr>
-              <a:t>Use and IDE (integrated development environment), like RStudio</a:t>
+              <a:t>Use an IDE (integrated development environment), like RStudio</a:t>
             </a:r>
           </a:p>
           <a:p>
@@ -5388,7 +5429,7 @@
                   </a:schemeClr>
                 </a:solidFill>
               </a:rPr>
-              <a:t>Use and IDE (integrated development environment), like RStudio</a:t>
+              <a:t>Use an IDE (integrated development environment), like RStudio</a:t>
             </a:r>
           </a:p>
           <a:p>
@@ -6391,7 +6432,7 @@
             </a:pPr>
             <a:r>
               <a:rPr lang="en-US" dirty="0"/>
-              <a:t>Use and IDE (integrated development environment), like RStudio</a:t>
+              <a:t>Use an IDE (integrated development environment), like RStudio</a:t>
             </a:r>
           </a:p>
         </p:txBody>
@@ -6511,7 +6552,7 @@
                   </a:schemeClr>
                 </a:solidFill>
               </a:rPr>
-              <a:t>Use and IDE (integrated development environment), like RStudio</a:t>
+              <a:t>Use an IDE (integrated development environment), like RStudio</a:t>
             </a:r>
           </a:p>
           <a:p>
@@ -6641,7 +6682,7 @@
                   </a:schemeClr>
                 </a:solidFill>
               </a:rPr>
-              <a:t>Use and IDE (integrated development environment), like RStudio</a:t>
+              <a:t>Use an IDE (integrated development environment), like RStudio</a:t>
             </a:r>
           </a:p>
           <a:p>

</xml_diff>

<commit_message>
added some notes on slides
</commit_message>
<xml_diff>
--- a/slides/00_Introduction.pptx
+++ b/slides/00_Introduction.pptx
@@ -210,7 +210,7 @@
           <a:p>
             <a:fld id="{1E5C4FCB-B746-4C4C-A9B7-8031E0AED39D}" type="datetimeFigureOut">
               <a:rPr lang="en-US" smtClean="0"/>
-              <a:t>10/23/2019</a:t>
+              <a:t>10/24/2019</a:t>
             </a:fld>
             <a:endParaRPr lang="en-US"/>
           </a:p>
@@ -713,6 +713,198 @@
           <a:lstStyle/>
           <a:p>
             <a:r>
+              <a:rPr lang="en-US" sz="1200" b="0" i="0" kern="1200" dirty="0">
+                <a:solidFill>
+                  <a:schemeClr val="tx1"/>
+                </a:solidFill>
+                <a:effectLst/>
+                <a:latin typeface="+mn-lt"/>
+                <a:ea typeface="+mn-ea"/>
+                <a:cs typeface="+mn-cs"/>
+              </a:rPr>
+              <a:t>There’s nothing worse than discovering three months after the fact that you’ve only stored the results of an important calculation in your workspace, not the calculation itself in your code.</a:t>
+            </a:r>
+            <a:endParaRPr lang="en-US" dirty="0"/>
+          </a:p>
+        </p:txBody>
+      </p:sp>
+      <p:sp>
+        <p:nvSpPr>
+          <p:cNvPr id="4" name="Slide Number Placeholder 3"/>
+          <p:cNvSpPr>
+            <a:spLocks noGrp="1"/>
+          </p:cNvSpPr>
+          <p:nvPr>
+            <p:ph type="sldNum" sz="quarter" idx="5"/>
+          </p:nvPr>
+        </p:nvSpPr>
+        <p:spPr/>
+        <p:txBody>
+          <a:bodyPr/>
+          <a:lstStyle/>
+          <a:p>
+            <a:fld id="{3FB76516-566F-49EB-BABD-FB9F24C816BA}" type="slidenum">
+              <a:rPr lang="en-US" smtClean="0"/>
+              <a:t>6</a:t>
+            </a:fld>
+            <a:endParaRPr lang="en-US"/>
+          </a:p>
+        </p:txBody>
+      </p:sp>
+    </p:spTree>
+    <p:extLst>
+      <p:ext uri="{BB962C8B-B14F-4D97-AF65-F5344CB8AC3E}">
+        <p14:creationId xmlns:p14="http://schemas.microsoft.com/office/powerpoint/2010/main" val="3972560761"/>
+      </p:ext>
+    </p:extLst>
+  </p:cSld>
+  <p:clrMapOvr>
+    <a:masterClrMapping/>
+  </p:clrMapOvr>
+</p:notes>
+</file>
+
+<file path=ppt/notesSlides/notesSlide3.xml><?xml version="1.0" encoding="utf-8"?>
+<p:notes xmlns:a="http://schemas.openxmlformats.org/drawingml/2006/main" xmlns:r="http://schemas.openxmlformats.org/officeDocument/2006/relationships" xmlns:p="http://schemas.openxmlformats.org/presentationml/2006/main">
+  <p:cSld>
+    <p:spTree>
+      <p:nvGrpSpPr>
+        <p:cNvPr id="1" name=""/>
+        <p:cNvGrpSpPr/>
+        <p:nvPr/>
+      </p:nvGrpSpPr>
+      <p:grpSpPr>
+        <a:xfrm>
+          <a:off x="0" y="0"/>
+          <a:ext cx="0" cy="0"/>
+          <a:chOff x="0" y="0"/>
+          <a:chExt cx="0" cy="0"/>
+        </a:xfrm>
+      </p:grpSpPr>
+      <p:sp>
+        <p:nvSpPr>
+          <p:cNvPr id="2" name="Slide Image Placeholder 1"/>
+          <p:cNvSpPr>
+            <a:spLocks noGrp="1" noRot="1" noChangeAspect="1"/>
+          </p:cNvSpPr>
+          <p:nvPr>
+            <p:ph type="sldImg"/>
+          </p:nvPr>
+        </p:nvSpPr>
+        <p:spPr/>
+      </p:sp>
+      <p:sp>
+        <p:nvSpPr>
+          <p:cNvPr id="3" name="Notes Placeholder 2"/>
+          <p:cNvSpPr>
+            <a:spLocks noGrp="1"/>
+          </p:cNvSpPr>
+          <p:nvPr>
+            <p:ph type="body" idx="1"/>
+          </p:nvPr>
+        </p:nvSpPr>
+        <p:spPr/>
+        <p:txBody>
+          <a:bodyPr/>
+          <a:lstStyle/>
+          <a:p>
+            <a:r>
+              <a:rPr lang="en-US" sz="1200" b="0" i="0" kern="1200">
+                <a:solidFill>
+                  <a:schemeClr val="tx1"/>
+                </a:solidFill>
+                <a:effectLst/>
+                <a:latin typeface="+mn-lt"/>
+                <a:ea typeface="+mn-ea"/>
+                <a:cs typeface="+mn-cs"/>
+              </a:rPr>
+              <a:t>Everything you need is in one place, and cleanly separated from all the other projects that you are working on.</a:t>
+            </a:r>
+            <a:endParaRPr lang="en-US" dirty="0"/>
+          </a:p>
+        </p:txBody>
+      </p:sp>
+      <p:sp>
+        <p:nvSpPr>
+          <p:cNvPr id="4" name="Slide Number Placeholder 3"/>
+          <p:cNvSpPr>
+            <a:spLocks noGrp="1"/>
+          </p:cNvSpPr>
+          <p:nvPr>
+            <p:ph type="sldNum" sz="quarter" idx="5"/>
+          </p:nvPr>
+        </p:nvSpPr>
+        <p:spPr/>
+        <p:txBody>
+          <a:bodyPr/>
+          <a:lstStyle/>
+          <a:p>
+            <a:fld id="{3FB76516-566F-49EB-BABD-FB9F24C816BA}" type="slidenum">
+              <a:rPr lang="en-US" smtClean="0"/>
+              <a:t>8</a:t>
+            </a:fld>
+            <a:endParaRPr lang="en-US"/>
+          </a:p>
+        </p:txBody>
+      </p:sp>
+    </p:spTree>
+    <p:extLst>
+      <p:ext uri="{BB962C8B-B14F-4D97-AF65-F5344CB8AC3E}">
+        <p14:creationId xmlns:p14="http://schemas.microsoft.com/office/powerpoint/2010/main" val="4019572133"/>
+      </p:ext>
+    </p:extLst>
+  </p:cSld>
+  <p:clrMapOvr>
+    <a:masterClrMapping/>
+  </p:clrMapOvr>
+</p:notes>
+</file>
+
+<file path=ppt/notesSlides/notesSlide4.xml><?xml version="1.0" encoding="utf-8"?>
+<p:notes xmlns:a="http://schemas.openxmlformats.org/drawingml/2006/main" xmlns:r="http://schemas.openxmlformats.org/officeDocument/2006/relationships" xmlns:p="http://schemas.openxmlformats.org/presentationml/2006/main">
+  <p:cSld>
+    <p:spTree>
+      <p:nvGrpSpPr>
+        <p:cNvPr id="1" name=""/>
+        <p:cNvGrpSpPr/>
+        <p:nvPr/>
+      </p:nvGrpSpPr>
+      <p:grpSpPr>
+        <a:xfrm>
+          <a:off x="0" y="0"/>
+          <a:ext cx="0" cy="0"/>
+          <a:chOff x="0" y="0"/>
+          <a:chExt cx="0" cy="0"/>
+        </a:xfrm>
+      </p:grpSpPr>
+      <p:sp>
+        <p:nvSpPr>
+          <p:cNvPr id="2" name="Slide Image Placeholder 1"/>
+          <p:cNvSpPr>
+            <a:spLocks noGrp="1" noRot="1" noChangeAspect="1"/>
+          </p:cNvSpPr>
+          <p:nvPr>
+            <p:ph type="sldImg"/>
+          </p:nvPr>
+        </p:nvSpPr>
+        <p:spPr/>
+      </p:sp>
+      <p:sp>
+        <p:nvSpPr>
+          <p:cNvPr id="3" name="Notes Placeholder 2"/>
+          <p:cNvSpPr>
+            <a:spLocks noGrp="1"/>
+          </p:cNvSpPr>
+          <p:nvPr>
+            <p:ph type="body" idx="1"/>
+          </p:nvPr>
+        </p:nvSpPr>
+        <p:spPr/>
+        <p:txBody>
+          <a:bodyPr/>
+          <a:lstStyle/>
+          <a:p>
+            <a:r>
               <a:rPr lang="en-US" dirty="0"/>
               <a:t>We love:</a:t>
             </a:r>
@@ -862,7 +1054,7 @@
 </p:notes>
 </file>
 
-<file path=ppt/notesSlides/notesSlide3.xml><?xml version="1.0" encoding="utf-8"?>
+<file path=ppt/notesSlides/notesSlide5.xml><?xml version="1.0" encoding="utf-8"?>
 <p:notes xmlns:a="http://schemas.openxmlformats.org/drawingml/2006/main" xmlns:r="http://schemas.openxmlformats.org/officeDocument/2006/relationships" xmlns:p="http://schemas.openxmlformats.org/presentationml/2006/main">
   <p:cSld>
     <p:spTree>
@@ -1129,7 +1321,7 @@
           <a:p>
             <a:fld id="{20D5C61A-5CFD-4F71-B95C-19791C96A879}" type="datetime1">
               <a:rPr lang="en-US" smtClean="0"/>
-              <a:t>10/23/2019</a:t>
+              <a:t>10/24/2019</a:t>
             </a:fld>
             <a:endParaRPr lang="en-US"/>
           </a:p>
@@ -1330,7 +1522,7 @@
           <a:p>
             <a:fld id="{D4CD7D6E-FC46-4A12-A6C3-8129F8B1368D}" type="datetime1">
               <a:rPr lang="en-US" smtClean="0"/>
-              <a:t>10/23/2019</a:t>
+              <a:t>10/24/2019</a:t>
             </a:fld>
             <a:endParaRPr lang="en-US"/>
           </a:p>
@@ -1541,7 +1733,7 @@
           <a:p>
             <a:fld id="{1DDFA410-B7A1-4F49-BCA0-ECCFDD861EDA}" type="datetime1">
               <a:rPr lang="en-US" smtClean="0"/>
-              <a:t>10/23/2019</a:t>
+              <a:t>10/24/2019</a:t>
             </a:fld>
             <a:endParaRPr lang="en-US"/>
           </a:p>
@@ -1742,7 +1934,7 @@
           <a:p>
             <a:fld id="{7DB4B2D1-4419-4F8E-BF16-436632790C10}" type="datetime1">
               <a:rPr lang="en-US" smtClean="0"/>
-              <a:t>10/23/2019</a:t>
+              <a:t>10/24/2019</a:t>
             </a:fld>
             <a:endParaRPr lang="en-US"/>
           </a:p>
@@ -2020,7 +2212,7 @@
           <a:p>
             <a:fld id="{DD5A4F1C-AF24-4413-9AF7-5D2E8BD63B7A}" type="datetime1">
               <a:rPr lang="en-US" smtClean="0"/>
-              <a:t>10/23/2019</a:t>
+              <a:t>10/24/2019</a:t>
             </a:fld>
             <a:endParaRPr lang="en-US"/>
           </a:p>
@@ -2288,7 +2480,7 @@
           <a:p>
             <a:fld id="{A30C4107-E5BF-4897-8B7F-7818781B2BEF}" type="datetime1">
               <a:rPr lang="en-US" smtClean="0"/>
-              <a:t>10/23/2019</a:t>
+              <a:t>10/24/2019</a:t>
             </a:fld>
             <a:endParaRPr lang="en-US"/>
           </a:p>
@@ -2703,7 +2895,7 @@
           <a:p>
             <a:fld id="{94B7E4A7-AF5C-43D4-B525-193EDF4CF928}" type="datetime1">
               <a:rPr lang="en-US" smtClean="0"/>
-              <a:t>10/23/2019</a:t>
+              <a:t>10/24/2019</a:t>
             </a:fld>
             <a:endParaRPr lang="en-US"/>
           </a:p>
@@ -2847,7 +3039,7 @@
           <a:p>
             <a:fld id="{16171D16-98A7-4147-8F21-548CB1F5A2CB}" type="datetime1">
               <a:rPr lang="en-US" smtClean="0"/>
-              <a:t>10/23/2019</a:t>
+              <a:t>10/24/2019</a:t>
             </a:fld>
             <a:endParaRPr lang="en-US"/>
           </a:p>
@@ -2963,7 +3155,7 @@
           <a:p>
             <a:fld id="{2BFC181B-AF2C-4698-833D-9791346A0D31}" type="datetime1">
               <a:rPr lang="en-US" smtClean="0"/>
-              <a:t>10/23/2019</a:t>
+              <a:t>10/24/2019</a:t>
             </a:fld>
             <a:endParaRPr lang="en-US"/>
           </a:p>
@@ -3277,7 +3469,7 @@
           <a:p>
             <a:fld id="{415F48C5-B639-4D35-B8B9-E2201BDB316A}" type="datetime1">
               <a:rPr lang="en-US" smtClean="0"/>
-              <a:t>10/23/2019</a:t>
+              <a:t>10/24/2019</a:t>
             </a:fld>
             <a:endParaRPr lang="en-US"/>
           </a:p>
@@ -3568,7 +3760,7 @@
           <a:p>
             <a:fld id="{3F590B41-551D-4AEE-A188-C74BAB065259}" type="datetime1">
               <a:rPr lang="en-US" smtClean="0"/>
-              <a:t>10/23/2019</a:t>
+              <a:t>10/24/2019</a:t>
             </a:fld>
             <a:endParaRPr lang="en-US"/>
           </a:p>
@@ -3812,7 +4004,7 @@
           <a:p>
             <a:fld id="{DA4D72AF-D22F-4C9E-9728-19507CB6CEA6}" type="datetime1">
               <a:rPr lang="en-US" smtClean="0"/>
-              <a:t>10/23/2019</a:t>
+              <a:t>10/24/2019</a:t>
             </a:fld>
             <a:endParaRPr lang="en-US"/>
           </a:p>

</xml_diff>